<commit_message>
ISS-45: Fix reading empty paragraphs
</commit_message>
<xml_diff>
--- a/test/SlideXML.Tests/Resource/010.pptx
+++ b/test/SlideXML.Tests/Resource/010.pptx
@@ -375,7 +375,7 @@
               <a:pPr>
                 <a:defRPr/>
               </a:pPr>
-              <a:t>1/19/2020</a:t>
+              <a:t>1/30/2020</a:t>
             </a:fld>
             <a:endParaRPr lang="en-US" dirty="0"/>
           </a:p>
@@ -619,7 +619,7 @@
               <a:pPr>
                 <a:defRPr/>
               </a:pPr>
-              <a:t>1/19/2020</a:t>
+              <a:t>1/30/2020</a:t>
             </a:fld>
             <a:endParaRPr lang="en-US" dirty="0"/>
           </a:p>
@@ -1013,7 +1013,7 @@
           <a:graphicData uri="http://schemas.openxmlformats.org/presentationml/2006/ole">
             <mc:AlternateContent xmlns:mc="http://schemas.openxmlformats.org/markup-compatibility/2006">
               <mc:Choice xmlns:v="urn:schemas-microsoft-com:vml" Requires="v">
-                <p:oleObj spid="_x0000_s83986" name="think-cell Slide" r:id="rId9" imgW="360" imgH="360" progId="TCLayout.ActiveDocument.1">
+                <p:oleObj spid="_x0000_s83987" name="think-cell Slide" r:id="rId9" imgW="360" imgH="360" progId="TCLayout.ActiveDocument.1">
                   <p:embed/>
                 </p:oleObj>
               </mc:Choice>
@@ -1086,48 +1086,6 @@
           </a:graphicData>
         </a:graphic>
       </p:graphicFrame>
-      <p:cxnSp>
-        <p:nvCxnSpPr>
-          <p:cNvPr id="6" name="Straight Connector 5">
-            <a:extLst>
-              <a:ext uri="{FF2B5EF4-FFF2-40B4-BE49-F238E27FC236}">
-                <a16:creationId xmlns:a16="http://schemas.microsoft.com/office/drawing/2014/main" id="{3CA36519-1DEE-4E00-90D1-9270F3ED240D}"/>
-              </a:ext>
-            </a:extLst>
-          </p:cNvPr>
-          <p:cNvCxnSpPr/>
-          <p:nvPr userDrawn="1"/>
-        </p:nvCxnSpPr>
-        <p:spPr>
-          <a:xfrm>
-            <a:off x="481013" y="1747838"/>
-            <a:ext cx="8178800" cy="0"/>
-          </a:xfrm>
-          <a:prstGeom prst="line">
-            <a:avLst/>
-          </a:prstGeom>
-          <a:ln w="12700" cap="rnd">
-            <a:solidFill>
-              <a:schemeClr val="accent1"/>
-            </a:solidFill>
-            <a:prstDash val="sysDot"/>
-          </a:ln>
-        </p:spPr>
-        <p:style>
-          <a:lnRef idx="1">
-            <a:schemeClr val="accent1"/>
-          </a:lnRef>
-          <a:fillRef idx="0">
-            <a:schemeClr val="accent1"/>
-          </a:fillRef>
-          <a:effectRef idx="0">
-            <a:schemeClr val="accent1"/>
-          </a:effectRef>
-          <a:fontRef idx="minor">
-            <a:schemeClr val="tx1"/>
-          </a:fontRef>
-        </p:style>
-      </p:cxnSp>
       <p:sp>
         <p:nvSpPr>
           <p:cNvPr id="7" name="PwC Text">
@@ -1242,90 +1200,6 @@
           </a:p>
         </p:txBody>
       </p:sp>
-      <p:cxnSp>
-        <p:nvCxnSpPr>
-          <p:cNvPr id="9" name="Frame Line">
-            <a:extLst>
-              <a:ext uri="{FF2B5EF4-FFF2-40B4-BE49-F238E27FC236}">
-                <a16:creationId xmlns:a16="http://schemas.microsoft.com/office/drawing/2014/main" id="{DE2492D2-0FDB-4807-B675-30EB967981F9}"/>
-              </a:ext>
-            </a:extLst>
-          </p:cNvPr>
-          <p:cNvCxnSpPr/>
-          <p:nvPr userDrawn="1"/>
-        </p:nvCxnSpPr>
-        <p:spPr>
-          <a:xfrm flipV="1">
-            <a:off x="346075" y="823913"/>
-            <a:ext cx="8313738" cy="127000"/>
-          </a:xfrm>
-          <a:prstGeom prst="bentConnector3">
-            <a:avLst>
-              <a:gd name="adj1" fmla="val 0"/>
-            </a:avLst>
-          </a:prstGeom>
-          <a:ln w="9525">
-            <a:solidFill>
-              <a:schemeClr val="accent1"/>
-            </a:solidFill>
-          </a:ln>
-        </p:spPr>
-        <p:style>
-          <a:lnRef idx="1">
-            <a:schemeClr val="accent1"/>
-          </a:lnRef>
-          <a:fillRef idx="0">
-            <a:schemeClr val="accent1"/>
-          </a:fillRef>
-          <a:effectRef idx="0">
-            <a:schemeClr val="accent1"/>
-          </a:effectRef>
-          <a:fontRef idx="minor">
-            <a:schemeClr val="tx1"/>
-          </a:fontRef>
-        </p:style>
-      </p:cxnSp>
-      <p:cxnSp>
-        <p:nvCxnSpPr>
-          <p:cNvPr id="10" name="Straight Connector 9">
-            <a:extLst>
-              <a:ext uri="{FF2B5EF4-FFF2-40B4-BE49-F238E27FC236}">
-                <a16:creationId xmlns:a16="http://schemas.microsoft.com/office/drawing/2014/main" id="{4B478A80-F597-4F13-9A21-9F9A16113D9F}"/>
-              </a:ext>
-            </a:extLst>
-          </p:cNvPr>
-          <p:cNvCxnSpPr/>
-          <p:nvPr userDrawn="1"/>
-        </p:nvCxnSpPr>
-        <p:spPr>
-          <a:xfrm>
-            <a:off x="482600" y="6253163"/>
-            <a:ext cx="8178800" cy="0"/>
-          </a:xfrm>
-          <a:prstGeom prst="line">
-            <a:avLst/>
-          </a:prstGeom>
-          <a:ln w="9525">
-            <a:solidFill>
-              <a:schemeClr val="accent1"/>
-            </a:solidFill>
-          </a:ln>
-        </p:spPr>
-        <p:style>
-          <a:lnRef idx="1">
-            <a:schemeClr val="accent1"/>
-          </a:lnRef>
-          <a:fillRef idx="0">
-            <a:schemeClr val="accent1"/>
-          </a:fillRef>
-          <a:effectRef idx="0">
-            <a:schemeClr val="accent1"/>
-          </a:effectRef>
-          <a:fontRef idx="minor">
-            <a:schemeClr val="tx1"/>
-          </a:fontRef>
-        </p:style>
-      </p:cxnSp>
       <p:sp>
         <p:nvSpPr>
           <p:cNvPr id="11" name="Section Header">
@@ -2030,7 +1904,7 @@
           <a:graphicData uri="http://schemas.openxmlformats.org/presentationml/2006/ole">
             <mc:AlternateContent xmlns:mc="http://schemas.openxmlformats.org/markup-compatibility/2006">
               <mc:Choice xmlns:v="urn:schemas-microsoft-com:vml" Requires="v">
-                <p:oleObj spid="_x0000_s1047" name="think-cell Slide" r:id="rId5" imgW="360" imgH="360" progId="TCLayout.ActiveDocument.1">
+                <p:oleObj spid="_x0000_s1048" name="think-cell Slide" r:id="rId5" imgW="360" imgH="360" progId="TCLayout.ActiveDocument.1">
                   <p:embed/>
                 </p:oleObj>
               </mc:Choice>

</xml_diff>